<commit_message>
edit the part of data clining in power point
</commit_message>
<xml_diff>
--- a/Presentation1.pptx
+++ b/Presentation1.pptx
@@ -278,7 +278,7 @@
           <a:p>
             <a:fld id="{05168ED7-7ABD-4B4F-A36D-3F55B8493473}" type="datetimeFigureOut">
               <a:rPr lang="en-CA" smtClean="0"/>
-              <a:t>2025-11-24</a:t>
+              <a:t>2025-11-28</a:t>
             </a:fld>
             <a:endParaRPr lang="en-CA"/>
           </a:p>
@@ -478,7 +478,7 @@
           <a:p>
             <a:fld id="{05168ED7-7ABD-4B4F-A36D-3F55B8493473}" type="datetimeFigureOut">
               <a:rPr lang="en-CA" smtClean="0"/>
-              <a:t>2025-11-24</a:t>
+              <a:t>2025-11-28</a:t>
             </a:fld>
             <a:endParaRPr lang="en-CA"/>
           </a:p>
@@ -688,7 +688,7 @@
           <a:p>
             <a:fld id="{05168ED7-7ABD-4B4F-A36D-3F55B8493473}" type="datetimeFigureOut">
               <a:rPr lang="en-CA" smtClean="0"/>
-              <a:t>2025-11-24</a:t>
+              <a:t>2025-11-28</a:t>
             </a:fld>
             <a:endParaRPr lang="en-CA"/>
           </a:p>
@@ -888,7 +888,7 @@
           <a:p>
             <a:fld id="{05168ED7-7ABD-4B4F-A36D-3F55B8493473}" type="datetimeFigureOut">
               <a:rPr lang="en-CA" smtClean="0"/>
-              <a:t>2025-11-24</a:t>
+              <a:t>2025-11-28</a:t>
             </a:fld>
             <a:endParaRPr lang="en-CA"/>
           </a:p>
@@ -1164,7 +1164,7 @@
           <a:p>
             <a:fld id="{05168ED7-7ABD-4B4F-A36D-3F55B8493473}" type="datetimeFigureOut">
               <a:rPr lang="en-CA" smtClean="0"/>
-              <a:t>2025-11-24</a:t>
+              <a:t>2025-11-28</a:t>
             </a:fld>
             <a:endParaRPr lang="en-CA"/>
           </a:p>
@@ -1432,7 +1432,7 @@
           <a:p>
             <a:fld id="{05168ED7-7ABD-4B4F-A36D-3F55B8493473}" type="datetimeFigureOut">
               <a:rPr lang="en-CA" smtClean="0"/>
-              <a:t>2025-11-24</a:t>
+              <a:t>2025-11-28</a:t>
             </a:fld>
             <a:endParaRPr lang="en-CA"/>
           </a:p>
@@ -1847,7 +1847,7 @@
           <a:p>
             <a:fld id="{05168ED7-7ABD-4B4F-A36D-3F55B8493473}" type="datetimeFigureOut">
               <a:rPr lang="en-CA" smtClean="0"/>
-              <a:t>2025-11-24</a:t>
+              <a:t>2025-11-28</a:t>
             </a:fld>
             <a:endParaRPr lang="en-CA"/>
           </a:p>
@@ -1989,7 +1989,7 @@
           <a:p>
             <a:fld id="{05168ED7-7ABD-4B4F-A36D-3F55B8493473}" type="datetimeFigureOut">
               <a:rPr lang="en-CA" smtClean="0"/>
-              <a:t>2025-11-24</a:t>
+              <a:t>2025-11-28</a:t>
             </a:fld>
             <a:endParaRPr lang="en-CA"/>
           </a:p>
@@ -2102,7 +2102,7 @@
           <a:p>
             <a:fld id="{05168ED7-7ABD-4B4F-A36D-3F55B8493473}" type="datetimeFigureOut">
               <a:rPr lang="en-CA" smtClean="0"/>
-              <a:t>2025-11-24</a:t>
+              <a:t>2025-11-28</a:t>
             </a:fld>
             <a:endParaRPr lang="en-CA"/>
           </a:p>
@@ -2415,7 +2415,7 @@
           <a:p>
             <a:fld id="{05168ED7-7ABD-4B4F-A36D-3F55B8493473}" type="datetimeFigureOut">
               <a:rPr lang="en-CA" smtClean="0"/>
-              <a:t>2025-11-24</a:t>
+              <a:t>2025-11-28</a:t>
             </a:fld>
             <a:endParaRPr lang="en-CA"/>
           </a:p>
@@ -2704,7 +2704,7 @@
           <a:p>
             <a:fld id="{05168ED7-7ABD-4B4F-A36D-3F55B8493473}" type="datetimeFigureOut">
               <a:rPr lang="en-CA" smtClean="0"/>
-              <a:t>2025-11-24</a:t>
+              <a:t>2025-11-28</a:t>
             </a:fld>
             <a:endParaRPr lang="en-CA"/>
           </a:p>
@@ -2947,7 +2947,7 @@
           <a:p>
             <a:fld id="{05168ED7-7ABD-4B4F-A36D-3F55B8493473}" type="datetimeFigureOut">
               <a:rPr lang="en-CA" smtClean="0"/>
-              <a:t>2025-11-24</a:t>
+              <a:t>2025-11-28</a:t>
             </a:fld>
             <a:endParaRPr lang="en-CA"/>
           </a:p>
@@ -3639,7 +3639,7 @@
         </p:nvCxnSpPr>
         <p:spPr>
           <a:xfrm>
-            <a:off x="821933" y="195209"/>
+            <a:off x="0" y="195208"/>
             <a:ext cx="0" cy="6565187"/>
           </a:xfrm>
           <a:prstGeom prst="line">
@@ -3666,7 +3666,7 @@
           <p:cNvPr id="3" name="Picture 2">
             <a:extLst>
               <a:ext uri="{FF2B5EF4-FFF2-40B4-BE49-F238E27FC236}">
-                <a16:creationId xmlns:a16="http://schemas.microsoft.com/office/drawing/2014/main" id="{A8BF365C-A5FC-1C53-CD27-FD233200443D}"/>
+                <a16:creationId xmlns:a16="http://schemas.microsoft.com/office/drawing/2014/main" id="{FEFF0877-197D-4C93-E6DB-8277AFE94F5F}"/>
               </a:ext>
             </a:extLst>
           </p:cNvPr>
@@ -3689,14 +3689,86 @@
         </p:blipFill>
         <p:spPr>
           <a:xfrm>
-            <a:off x="2972647" y="1918340"/>
-            <a:ext cx="5571555" cy="4178666"/>
+            <a:off x="-1" y="2749442"/>
+            <a:ext cx="12192000" cy="1646003"/>
           </a:xfrm>
           <a:prstGeom prst="rect">
             <a:avLst/>
           </a:prstGeom>
         </p:spPr>
       </p:pic>
+      <p:pic>
+        <p:nvPicPr>
+          <p:cNvPr id="7" name="Picture 6">
+            <a:extLst>
+              <a:ext uri="{FF2B5EF4-FFF2-40B4-BE49-F238E27FC236}">
+                <a16:creationId xmlns:a16="http://schemas.microsoft.com/office/drawing/2014/main" id="{92F8A1F6-1FEC-2AB0-E6A9-B0F56BD40CFD}"/>
+              </a:ext>
+            </a:extLst>
+          </p:cNvPr>
+          <p:cNvPicPr>
+            <a:picLocks noChangeAspect="1"/>
+          </p:cNvPicPr>
+          <p:nvPr/>
+        </p:nvPicPr>
+        <p:blipFill>
+          <a:blip r:embed="rId3">
+            <a:extLst>
+              <a:ext uri="{28A0092B-C50C-407E-A947-70E740481C1C}">
+                <a14:useLocalDpi xmlns:a14="http://schemas.microsoft.com/office/drawing/2010/main" val="0"/>
+              </a:ext>
+            </a:extLst>
+          </a:blip>
+          <a:stretch>
+            <a:fillRect/>
+          </a:stretch>
+        </p:blipFill>
+        <p:spPr>
+          <a:xfrm>
+            <a:off x="0" y="4808126"/>
+            <a:ext cx="12192000" cy="1467875"/>
+          </a:xfrm>
+          <a:prstGeom prst="rect">
+            <a:avLst/>
+          </a:prstGeom>
+        </p:spPr>
+      </p:pic>
+      <p:sp>
+        <p:nvSpPr>
+          <p:cNvPr id="8" name="TextBox 7">
+            <a:extLst>
+              <a:ext uri="{FF2B5EF4-FFF2-40B4-BE49-F238E27FC236}">
+                <a16:creationId xmlns:a16="http://schemas.microsoft.com/office/drawing/2014/main" id="{5EEE25E9-E485-758B-C670-A30EACF151BC}"/>
+              </a:ext>
+            </a:extLst>
+          </p:cNvPr>
+          <p:cNvSpPr txBox="1"/>
+          <p:nvPr/>
+        </p:nvSpPr>
+        <p:spPr>
+          <a:xfrm>
+            <a:off x="897272" y="1875096"/>
+            <a:ext cx="11171437" cy="461665"/>
+          </a:xfrm>
+          <a:prstGeom prst="rect">
+            <a:avLst/>
+          </a:prstGeom>
+          <a:noFill/>
+        </p:spPr>
+        <p:txBody>
+          <a:bodyPr wrap="square" rtlCol="0">
+            <a:spAutoFit/>
+          </a:bodyPr>
+          <a:lstStyle/>
+          <a:p>
+            <a:r>
+              <a:rPr lang="en-CA" sz="2400" b="1" dirty="0"/>
+              <a:t>In our study, we notice that there are characteristics that are not useful to us, such as:</a:t>
+            </a:r>
+            <a:endParaRPr lang="en-CA" sz="2400" dirty="0"/>
+          </a:p>
+        </p:txBody>
+      </p:sp>
     </p:spTree>
     <p:extLst>
       <p:ext uri="{BB962C8B-B14F-4D97-AF65-F5344CB8AC3E}">
@@ -3828,7 +3900,7 @@
           <p:cNvPr id="3" name="Picture 2">
             <a:extLst>
               <a:ext uri="{FF2B5EF4-FFF2-40B4-BE49-F238E27FC236}">
-                <a16:creationId xmlns:a16="http://schemas.microsoft.com/office/drawing/2014/main" id="{8EDF486D-ABC6-D324-0B93-F4322D3475A9}"/>
+                <a16:creationId xmlns:a16="http://schemas.microsoft.com/office/drawing/2014/main" id="{4CB9BDB9-1532-C64B-B43F-F490E6576059}"/>
               </a:ext>
             </a:extLst>
           </p:cNvPr>
@@ -3851,14 +3923,127 @@
         </p:blipFill>
         <p:spPr>
           <a:xfrm>
-            <a:off x="2669561" y="1995750"/>
-            <a:ext cx="6400813" cy="4572009"/>
+            <a:off x="1258854" y="2034495"/>
+            <a:ext cx="4680000" cy="3303313"/>
           </a:xfrm>
           <a:prstGeom prst="rect">
             <a:avLst/>
           </a:prstGeom>
         </p:spPr>
       </p:pic>
+      <p:pic>
+        <p:nvPicPr>
+          <p:cNvPr id="7" name="Picture 6">
+            <a:extLst>
+              <a:ext uri="{FF2B5EF4-FFF2-40B4-BE49-F238E27FC236}">
+                <a16:creationId xmlns:a16="http://schemas.microsoft.com/office/drawing/2014/main" id="{816F17FC-023E-9518-AA2B-F6F75E342087}"/>
+              </a:ext>
+            </a:extLst>
+          </p:cNvPr>
+          <p:cNvPicPr>
+            <a:picLocks noChangeAspect="1"/>
+          </p:cNvPicPr>
+          <p:nvPr/>
+        </p:nvPicPr>
+        <p:blipFill>
+          <a:blip r:embed="rId3">
+            <a:extLst>
+              <a:ext uri="{28A0092B-C50C-407E-A947-70E740481C1C}">
+                <a14:useLocalDpi xmlns:a14="http://schemas.microsoft.com/office/drawing/2010/main" val="0"/>
+              </a:ext>
+            </a:extLst>
+          </a:blip>
+          <a:stretch>
+            <a:fillRect/>
+          </a:stretch>
+        </p:blipFill>
+        <p:spPr>
+          <a:xfrm>
+            <a:off x="6745642" y="2034495"/>
+            <a:ext cx="5137932" cy="3304800"/>
+          </a:xfrm>
+          <a:prstGeom prst="rect">
+            <a:avLst/>
+          </a:prstGeom>
+        </p:spPr>
+      </p:pic>
+      <p:sp>
+        <p:nvSpPr>
+          <p:cNvPr id="8" name="TextBox 7">
+            <a:extLst>
+              <a:ext uri="{FF2B5EF4-FFF2-40B4-BE49-F238E27FC236}">
+                <a16:creationId xmlns:a16="http://schemas.microsoft.com/office/drawing/2014/main" id="{565D6B65-D9AD-D3CC-1FE2-A3D3F6CC5599}"/>
+              </a:ext>
+            </a:extLst>
+          </p:cNvPr>
+          <p:cNvSpPr txBox="1"/>
+          <p:nvPr/>
+        </p:nvSpPr>
+        <p:spPr>
+          <a:xfrm>
+            <a:off x="3070674" y="6129894"/>
+            <a:ext cx="1160980" cy="461665"/>
+          </a:xfrm>
+          <a:prstGeom prst="rect">
+            <a:avLst/>
+          </a:prstGeom>
+          <a:noFill/>
+        </p:spPr>
+        <p:txBody>
+          <a:bodyPr wrap="square" rtlCol="0">
+            <a:spAutoFit/>
+          </a:bodyPr>
+          <a:lstStyle/>
+          <a:p>
+            <a:pPr algn="ctr"/>
+            <a:r>
+              <a:rPr lang="en-GB" sz="2400" dirty="0"/>
+              <a:t>Before</a:t>
+            </a:r>
+            <a:r>
+              <a:rPr lang="en-CA" sz="2400" dirty="0"/>
+              <a:t> </a:t>
+            </a:r>
+            <a:endParaRPr lang="en-GB" sz="2400" dirty="0"/>
+          </a:p>
+        </p:txBody>
+      </p:sp>
+      <p:sp>
+        <p:nvSpPr>
+          <p:cNvPr id="9" name="TextBox 8">
+            <a:extLst>
+              <a:ext uri="{FF2B5EF4-FFF2-40B4-BE49-F238E27FC236}">
+                <a16:creationId xmlns:a16="http://schemas.microsoft.com/office/drawing/2014/main" id="{19E0017A-1378-F59D-52EA-8AE8977C3675}"/>
+              </a:ext>
+            </a:extLst>
+          </p:cNvPr>
+          <p:cNvSpPr txBox="1"/>
+          <p:nvPr/>
+        </p:nvSpPr>
+        <p:spPr>
+          <a:xfrm>
+            <a:off x="8156530" y="6129892"/>
+            <a:ext cx="1160980" cy="461665"/>
+          </a:xfrm>
+          <a:prstGeom prst="rect">
+            <a:avLst/>
+          </a:prstGeom>
+          <a:noFill/>
+        </p:spPr>
+        <p:txBody>
+          <a:bodyPr wrap="square" rtlCol="0">
+            <a:spAutoFit/>
+          </a:bodyPr>
+          <a:lstStyle/>
+          <a:p>
+            <a:pPr algn="ctr"/>
+            <a:r>
+              <a:rPr lang="en-GB" sz="2400" dirty="0"/>
+              <a:t>After </a:t>
+            </a:r>
+          </a:p>
+        </p:txBody>
+      </p:sp>
     </p:spTree>
     <p:extLst>
       <p:ext uri="{BB962C8B-B14F-4D97-AF65-F5344CB8AC3E}">
@@ -7929,10 +8114,10 @@
       </p:sp>
       <p:pic>
         <p:nvPicPr>
-          <p:cNvPr id="15" name="Picture 14">
-            <a:extLst>
-              <a:ext uri="{FF2B5EF4-FFF2-40B4-BE49-F238E27FC236}">
-                <a16:creationId xmlns:a16="http://schemas.microsoft.com/office/drawing/2014/main" id="{9860A269-3C4F-99EB-8913-5C461BAA3132}"/>
+          <p:cNvPr id="4" name="Picture 3">
+            <a:extLst>
+              <a:ext uri="{FF2B5EF4-FFF2-40B4-BE49-F238E27FC236}">
+                <a16:creationId xmlns:a16="http://schemas.microsoft.com/office/drawing/2014/main" id="{28963107-70DB-0FB7-C97A-8EC8AFE9E19B}"/>
               </a:ext>
             </a:extLst>
           </p:cNvPr>
@@ -7955,14 +8140,127 @@
         </p:blipFill>
         <p:spPr>
           <a:xfrm>
-            <a:off x="2440703" y="2061014"/>
-            <a:ext cx="7463583" cy="4699381"/>
+            <a:off x="1661012" y="2387557"/>
+            <a:ext cx="3691821" cy="3262842"/>
           </a:xfrm>
           <a:prstGeom prst="rect">
             <a:avLst/>
           </a:prstGeom>
         </p:spPr>
       </p:pic>
+      <p:pic>
+        <p:nvPicPr>
+          <p:cNvPr id="8" name="Picture 7">
+            <a:extLst>
+              <a:ext uri="{FF2B5EF4-FFF2-40B4-BE49-F238E27FC236}">
+                <a16:creationId xmlns:a16="http://schemas.microsoft.com/office/drawing/2014/main" id="{5FEFA8A0-062C-BF15-697D-B863E93AB0A0}"/>
+              </a:ext>
+            </a:extLst>
+          </p:cNvPr>
+          <p:cNvPicPr>
+            <a:picLocks noChangeAspect="1"/>
+          </p:cNvPicPr>
+          <p:nvPr/>
+        </p:nvPicPr>
+        <p:blipFill>
+          <a:blip r:embed="rId3">
+            <a:extLst>
+              <a:ext uri="{28A0092B-C50C-407E-A947-70E740481C1C}">
+                <a14:useLocalDpi xmlns:a14="http://schemas.microsoft.com/office/drawing/2010/main" val="0"/>
+              </a:ext>
+            </a:extLst>
+          </a:blip>
+          <a:stretch>
+            <a:fillRect/>
+          </a:stretch>
+        </p:blipFill>
+        <p:spPr>
+          <a:xfrm>
+            <a:off x="6904237" y="2387557"/>
+            <a:ext cx="3796289" cy="3261600"/>
+          </a:xfrm>
+          <a:prstGeom prst="rect">
+            <a:avLst/>
+          </a:prstGeom>
+        </p:spPr>
+      </p:pic>
+      <p:sp>
+        <p:nvSpPr>
+          <p:cNvPr id="9" name="TextBox 8">
+            <a:extLst>
+              <a:ext uri="{FF2B5EF4-FFF2-40B4-BE49-F238E27FC236}">
+                <a16:creationId xmlns:a16="http://schemas.microsoft.com/office/drawing/2014/main" id="{16BC8362-B358-09DE-2B5E-BDF9BBB3F2D9}"/>
+              </a:ext>
+            </a:extLst>
+          </p:cNvPr>
+          <p:cNvSpPr txBox="1"/>
+          <p:nvPr/>
+        </p:nvSpPr>
+        <p:spPr>
+          <a:xfrm>
+            <a:off x="3070674" y="6129894"/>
+            <a:ext cx="1160980" cy="461665"/>
+          </a:xfrm>
+          <a:prstGeom prst="rect">
+            <a:avLst/>
+          </a:prstGeom>
+          <a:noFill/>
+        </p:spPr>
+        <p:txBody>
+          <a:bodyPr wrap="square" rtlCol="0">
+            <a:spAutoFit/>
+          </a:bodyPr>
+          <a:lstStyle/>
+          <a:p>
+            <a:pPr algn="ctr"/>
+            <a:r>
+              <a:rPr lang="en-GB" sz="2400" dirty="0"/>
+              <a:t>Before</a:t>
+            </a:r>
+            <a:r>
+              <a:rPr lang="en-CA" sz="2400" dirty="0"/>
+              <a:t> </a:t>
+            </a:r>
+            <a:endParaRPr lang="en-GB" sz="2400" dirty="0"/>
+          </a:p>
+        </p:txBody>
+      </p:sp>
+      <p:sp>
+        <p:nvSpPr>
+          <p:cNvPr id="10" name="TextBox 9">
+            <a:extLst>
+              <a:ext uri="{FF2B5EF4-FFF2-40B4-BE49-F238E27FC236}">
+                <a16:creationId xmlns:a16="http://schemas.microsoft.com/office/drawing/2014/main" id="{E8B729AC-9D31-AD72-9F99-1DE519F9C34D}"/>
+              </a:ext>
+            </a:extLst>
+          </p:cNvPr>
+          <p:cNvSpPr txBox="1"/>
+          <p:nvPr/>
+        </p:nvSpPr>
+        <p:spPr>
+          <a:xfrm>
+            <a:off x="8156530" y="6129892"/>
+            <a:ext cx="1160980" cy="461665"/>
+          </a:xfrm>
+          <a:prstGeom prst="rect">
+            <a:avLst/>
+          </a:prstGeom>
+          <a:noFill/>
+        </p:spPr>
+        <p:txBody>
+          <a:bodyPr wrap="square" rtlCol="0">
+            <a:spAutoFit/>
+          </a:bodyPr>
+          <a:lstStyle/>
+          <a:p>
+            <a:pPr algn="ctr"/>
+            <a:r>
+              <a:rPr lang="en-GB" sz="2400" dirty="0"/>
+              <a:t>After </a:t>
+            </a:r>
+          </a:p>
+        </p:txBody>
+      </p:sp>
     </p:spTree>
     <p:extLst>
       <p:ext uri="{BB962C8B-B14F-4D97-AF65-F5344CB8AC3E}">
@@ -8512,12 +8810,84 @@
           </a:p>
         </p:txBody>
       </p:sp>
-      <p:sp>
-        <p:nvSpPr>
-          <p:cNvPr id="12" name="TextBox 11">
-            <a:extLst>
-              <a:ext uri="{FF2B5EF4-FFF2-40B4-BE49-F238E27FC236}">
-                <a16:creationId xmlns:a16="http://schemas.microsoft.com/office/drawing/2014/main" id="{DB054DAB-A004-4532-F515-46CFABB9FBF2}"/>
+      <p:pic>
+        <p:nvPicPr>
+          <p:cNvPr id="3" name="Picture 2">
+            <a:extLst>
+              <a:ext uri="{FF2B5EF4-FFF2-40B4-BE49-F238E27FC236}">
+                <a16:creationId xmlns:a16="http://schemas.microsoft.com/office/drawing/2014/main" id="{34C2E89A-C243-B837-9C90-BAFC349BC0A8}"/>
+              </a:ext>
+            </a:extLst>
+          </p:cNvPr>
+          <p:cNvPicPr>
+            <a:picLocks noChangeAspect="1"/>
+          </p:cNvPicPr>
+          <p:nvPr/>
+        </p:nvPicPr>
+        <p:blipFill>
+          <a:blip r:embed="rId2">
+            <a:extLst>
+              <a:ext uri="{28A0092B-C50C-407E-A947-70E740481C1C}">
+                <a14:useLocalDpi xmlns:a14="http://schemas.microsoft.com/office/drawing/2010/main" val="0"/>
+              </a:ext>
+            </a:extLst>
+          </a:blip>
+          <a:stretch>
+            <a:fillRect/>
+          </a:stretch>
+        </p:blipFill>
+        <p:spPr>
+          <a:xfrm>
+            <a:off x="1778240" y="2576836"/>
+            <a:ext cx="3745848" cy="3382173"/>
+          </a:xfrm>
+          <a:prstGeom prst="rect">
+            <a:avLst/>
+          </a:prstGeom>
+        </p:spPr>
+      </p:pic>
+      <p:pic>
+        <p:nvPicPr>
+          <p:cNvPr id="8" name="Picture 7">
+            <a:extLst>
+              <a:ext uri="{FF2B5EF4-FFF2-40B4-BE49-F238E27FC236}">
+                <a16:creationId xmlns:a16="http://schemas.microsoft.com/office/drawing/2014/main" id="{0FE0CE61-127F-4594-D8F7-BCBAFC5CAAFA}"/>
+              </a:ext>
+            </a:extLst>
+          </p:cNvPr>
+          <p:cNvPicPr>
+            <a:picLocks noChangeAspect="1"/>
+          </p:cNvPicPr>
+          <p:nvPr/>
+        </p:nvPicPr>
+        <p:blipFill>
+          <a:blip r:embed="rId3">
+            <a:extLst>
+              <a:ext uri="{28A0092B-C50C-407E-A947-70E740481C1C}">
+                <a14:useLocalDpi xmlns:a14="http://schemas.microsoft.com/office/drawing/2010/main" val="0"/>
+              </a:ext>
+            </a:extLst>
+          </a:blip>
+          <a:stretch>
+            <a:fillRect/>
+          </a:stretch>
+        </p:blipFill>
+        <p:spPr>
+          <a:xfrm>
+            <a:off x="6847414" y="2575009"/>
+            <a:ext cx="3779212" cy="3384000"/>
+          </a:xfrm>
+          <a:prstGeom prst="rect">
+            <a:avLst/>
+          </a:prstGeom>
+        </p:spPr>
+      </p:pic>
+      <p:sp>
+        <p:nvSpPr>
+          <p:cNvPr id="9" name="TextBox 8">
+            <a:extLst>
+              <a:ext uri="{FF2B5EF4-FFF2-40B4-BE49-F238E27FC236}">
+                <a16:creationId xmlns:a16="http://schemas.microsoft.com/office/drawing/2014/main" id="{E8C0A9CA-A7E1-6FF0-1B13-C376321806D8}"/>
               </a:ext>
             </a:extLst>
           </p:cNvPr>
@@ -8526,8 +8896,8 @@
         </p:nvSpPr>
         <p:spPr>
           <a:xfrm>
-            <a:off x="2178120" y="3052752"/>
-            <a:ext cx="5373379" cy="1569660"/>
+            <a:off x="3070674" y="6129894"/>
+            <a:ext cx="1160980" cy="461665"/>
           </a:xfrm>
           <a:prstGeom prst="rect">
             <a:avLst/>
@@ -8540,72 +8910,52 @@
           </a:bodyPr>
           <a:lstStyle/>
           <a:p>
-            <a:pPr marL="285750" indent="-285750">
-              <a:buFont typeface="Wingdings" panose="05000000000000000000" pitchFamily="2" charset="2"/>
-              <a:buChar char="Ø"/>
-            </a:pPr>
+            <a:pPr algn="ctr"/>
+            <a:r>
+              <a:rPr lang="en-GB" sz="2400" dirty="0"/>
+              <a:t>Before</a:t>
+            </a:r>
             <a:r>
               <a:rPr lang="en-CA" sz="2400" dirty="0"/>
-              <a:t>Kristina Douglas </a:t>
-            </a:r>
-            <a:r>
-              <a:rPr lang="en-CA" sz="2400" dirty="0">
-                <a:sym typeface="Wingdings" panose="05000000000000000000" pitchFamily="2" charset="2"/>
-              </a:rPr>
-              <a:t> Female</a:t>
-            </a:r>
-            <a:endParaRPr lang="en-CA" sz="2400" dirty="0"/>
-          </a:p>
-          <a:p>
-            <a:pPr marL="285750" indent="-285750">
-              <a:buFont typeface="Wingdings" panose="05000000000000000000" pitchFamily="2" charset="2"/>
-              <a:buChar char="Ø"/>
-            </a:pPr>
-            <a:r>
-              <a:rPr lang="en-CA" sz="2400" dirty="0"/>
-              <a:t>Emily Torres </a:t>
-            </a:r>
-            <a:r>
-              <a:rPr lang="en-CA" sz="2400" dirty="0">
-                <a:sym typeface="Wingdings" panose="05000000000000000000" pitchFamily="2" charset="2"/>
-              </a:rPr>
-              <a:t> Female</a:t>
-            </a:r>
-            <a:endParaRPr lang="en-CA" sz="2400" dirty="0"/>
-          </a:p>
-          <a:p>
-            <a:pPr marL="285750" indent="-285750">
-              <a:buFont typeface="Wingdings" panose="05000000000000000000" pitchFamily="2" charset="2"/>
-              <a:buChar char="Ø"/>
-            </a:pPr>
-            <a:r>
-              <a:rPr lang="en-CA" sz="2400" dirty="0"/>
-              <a:t>James Anderson </a:t>
-            </a:r>
-            <a:r>
-              <a:rPr lang="en-CA" sz="2400" dirty="0">
-                <a:sym typeface="Wingdings" panose="05000000000000000000" pitchFamily="2" charset="2"/>
-              </a:rPr>
-              <a:t> Male</a:t>
-            </a:r>
-            <a:endParaRPr lang="en-CA" sz="2400" dirty="0"/>
-          </a:p>
-          <a:p>
-            <a:pPr marL="285750" indent="-285750">
-              <a:buFont typeface="Wingdings" panose="05000000000000000000" pitchFamily="2" charset="2"/>
-              <a:buChar char="Ø"/>
-            </a:pPr>
-            <a:r>
-              <a:rPr lang="en-CA" sz="2400" dirty="0"/>
-              <a:t>Jeffrey Meyers  </a:t>
-            </a:r>
-            <a:r>
-              <a:rPr lang="en-CA" sz="2400" dirty="0">
-                <a:sym typeface="Wingdings" panose="05000000000000000000" pitchFamily="2" charset="2"/>
-              </a:rPr>
-              <a:t> Male</a:t>
-            </a:r>
-            <a:endParaRPr lang="en-CA" sz="2400" dirty="0"/>
+              <a:t> </a:t>
+            </a:r>
+            <a:endParaRPr lang="en-GB" sz="2400" dirty="0"/>
+          </a:p>
+        </p:txBody>
+      </p:sp>
+      <p:sp>
+        <p:nvSpPr>
+          <p:cNvPr id="10" name="TextBox 9">
+            <a:extLst>
+              <a:ext uri="{FF2B5EF4-FFF2-40B4-BE49-F238E27FC236}">
+                <a16:creationId xmlns:a16="http://schemas.microsoft.com/office/drawing/2014/main" id="{14E762CD-3E66-FC0B-92D6-DAF1B516F29E}"/>
+              </a:ext>
+            </a:extLst>
+          </p:cNvPr>
+          <p:cNvSpPr txBox="1"/>
+          <p:nvPr/>
+        </p:nvSpPr>
+        <p:spPr>
+          <a:xfrm>
+            <a:off x="8156530" y="6129892"/>
+            <a:ext cx="1160980" cy="461665"/>
+          </a:xfrm>
+          <a:prstGeom prst="rect">
+            <a:avLst/>
+          </a:prstGeom>
+          <a:noFill/>
+        </p:spPr>
+        <p:txBody>
+          <a:bodyPr wrap="square" rtlCol="0">
+            <a:spAutoFit/>
+          </a:bodyPr>
+          <a:lstStyle/>
+          <a:p>
+            <a:pPr algn="ctr"/>
+            <a:r>
+              <a:rPr lang="en-GB" sz="2400" dirty="0"/>
+              <a:t>After </a:t>
+            </a:r>
           </a:p>
         </p:txBody>
       </p:sp>

</xml_diff>